<commit_message>
Updates of the presentation
</commit_message>
<xml_diff>
--- a/Presentation_midterm.pptx
+++ b/Presentation_midterm.pptx
@@ -5,7 +5,7 @@
     <p:sldMasterId id="2147483648" r:id="rId1"/>
   </p:sldMasterIdLst>
   <p:notesMasterIdLst>
-    <p:notesMasterId r:id="rId15"/>
+    <p:notesMasterId r:id="rId18"/>
   </p:notesMasterIdLst>
   <p:sldIdLst>
     <p:sldId id="256" r:id="rId2"/>
@@ -21,6 +21,9 @@
     <p:sldId id="268" r:id="rId12"/>
     <p:sldId id="269" r:id="rId13"/>
     <p:sldId id="270" r:id="rId14"/>
+    <p:sldId id="271" r:id="rId15"/>
+    <p:sldId id="273" r:id="rId16"/>
+    <p:sldId id="274" r:id="rId17"/>
   </p:sldIdLst>
   <p:sldSz cx="12192000" cy="6858000"/>
   <p:notesSz cx="6858000" cy="9144000"/>
@@ -258,7 +261,7 @@
       <p15:sldGuideLst xmlns:p15="http://schemas.microsoft.com/office/powerpoint/2012/main"/>
     </p:ext>
     <p:ext uri="http://customooxmlschemas.google.com/">
-      <go:slidesCustomData xmlns:go="http://customooxmlschemas.google.com/" xmlns:ahyp="http://schemas.microsoft.com/office/drawing/2018/hyperlinkcolor" xmlns:p15="http://schemas.microsoft.com/office/powerpoint/2012/main" xmlns:p14="http://schemas.microsoft.com/office/powerpoint/2010/main" xmlns:com="http://schemas.openxmlformats.org/drawingml/2006/compatibility" xmlns:pvml="urn:schemas-microsoft-com:office:powerpoint" xmlns:v="urn:schemas-microsoft-com:vml" xmlns:o="urn:schemas-microsoft-com:office:office" xmlns:dgm="http://schemas.openxmlformats.org/drawingml/2006/diagram" xmlns:c="http://schemas.openxmlformats.org/drawingml/2006/chart" xmlns:mv="urn:schemas-microsoft-com:mac:vml" xmlns:mc="http://schemas.openxmlformats.org/markup-compatibility/2006" xmlns="" r:id="rId20" roundtripDataSignature="AMtx7mhV++hMKseQWfytY63H4TYg9mFrEQ=="/>
+      <go:slidesCustomData xmlns="" xmlns:mc="http://schemas.openxmlformats.org/markup-compatibility/2006" xmlns:mv="urn:schemas-microsoft-com:mac:vml" xmlns:c="http://schemas.openxmlformats.org/drawingml/2006/chart" xmlns:dgm="http://schemas.openxmlformats.org/drawingml/2006/diagram" xmlns:o="urn:schemas-microsoft-com:office:office" xmlns:v="urn:schemas-microsoft-com:vml" xmlns:pvml="urn:schemas-microsoft-com:office:powerpoint" xmlns:com="http://schemas.openxmlformats.org/drawingml/2006/compatibility" xmlns:p14="http://schemas.microsoft.com/office/powerpoint/2010/main" xmlns:p15="http://schemas.microsoft.com/office/powerpoint/2012/main" xmlns:ahyp="http://schemas.microsoft.com/office/drawing/2018/hyperlinkcolor" xmlns:go="http://customooxmlschemas.google.com/" r:id="rId20" roundtripDataSignature="AMtx7mhV++hMKseQWfytY63H4TYg9mFrEQ=="/>
     </p:ext>
   </p:extLst>
 </p:presentation>
@@ -267,7 +270,7 @@
 <file path=ppt/revisionInfo.xml><?xml version="1.0" encoding="utf-8"?>
 <p1510:revInfo xmlns:a="http://schemas.openxmlformats.org/drawingml/2006/main" xmlns:r="http://schemas.openxmlformats.org/officeDocument/2006/relationships" xmlns:p1510="http://schemas.microsoft.com/office/powerpoint/2015/10/main">
   <p1510:revLst>
-    <p1510:client id="{50221FE2-3732-40EC-89C5-FD390CBB239C}" v="3" dt="2023-04-19T13:43:47.562"/>
+    <p1510:client id="{50221FE2-3732-40EC-89C5-FD390CBB239C}" v="6" dt="2023-04-20T11:17:11.864"/>
   </p1510:revLst>
 </p1510:revInfo>
 </file>
@@ -276,8 +279,8 @@
 <pc:chgInfo xmlns:a="http://schemas.openxmlformats.org/drawingml/2006/main" xmlns:r="http://schemas.openxmlformats.org/officeDocument/2006/relationships" xmlns:ac="http://schemas.microsoft.com/office/drawing/2013/main/command" xmlns:pc="http://schemas.microsoft.com/office/powerpoint/2013/main/command">
   <pc:docChgLst>
     <pc:chgData name="Andrea Archetti" userId="291975a6-52d4-44d6-83c4-62271c88eb97" providerId="ADAL" clId="{50221FE2-3732-40EC-89C5-FD390CBB239C}"/>
-    <pc:docChg chg="undo custSel delSld modSld">
-      <pc:chgData name="Andrea Archetti" userId="291975a6-52d4-44d6-83c4-62271c88eb97" providerId="ADAL" clId="{50221FE2-3732-40EC-89C5-FD390CBB239C}" dt="2023-04-19T18:29:19.928" v="19" actId="478"/>
+    <pc:docChg chg="undo custSel addSld delSld modSld">
+      <pc:chgData name="Andrea Archetti" userId="291975a6-52d4-44d6-83c4-62271c88eb97" providerId="ADAL" clId="{50221FE2-3732-40EC-89C5-FD390CBB239C}" dt="2023-04-20T11:18:31.252" v="101" actId="1076"/>
       <pc:docMkLst>
         <pc:docMk/>
       </pc:docMkLst>
@@ -372,6 +375,146 @@
             <ac:inkMk id="6" creationId="{8D2BB45D-1246-593D-32CF-1E5BF6FFC1C4}"/>
           </ac:inkMkLst>
         </pc:inkChg>
+      </pc:sldChg>
+      <pc:sldChg chg="addSp delSp modSp new mod">
+        <pc:chgData name="Andrea Archetti" userId="291975a6-52d4-44d6-83c4-62271c88eb97" providerId="ADAL" clId="{50221FE2-3732-40EC-89C5-FD390CBB239C}" dt="2023-04-20T11:12:08.244" v="71" actId="313"/>
+        <pc:sldMkLst>
+          <pc:docMk/>
+          <pc:sldMk cId="432629419" sldId="271"/>
+        </pc:sldMkLst>
+        <pc:spChg chg="del">
+          <ac:chgData name="Andrea Archetti" userId="291975a6-52d4-44d6-83c4-62271c88eb97" providerId="ADAL" clId="{50221FE2-3732-40EC-89C5-FD390CBB239C}" dt="2023-04-20T11:09:44.971" v="24" actId="478"/>
+          <ac:spMkLst>
+            <pc:docMk/>
+            <pc:sldMk cId="432629419" sldId="271"/>
+            <ac:spMk id="2" creationId="{5C054D49-E662-F29F-7A9F-ED623F09420E}"/>
+          </ac:spMkLst>
+        </pc:spChg>
+        <pc:spChg chg="del">
+          <ac:chgData name="Andrea Archetti" userId="291975a6-52d4-44d6-83c4-62271c88eb97" providerId="ADAL" clId="{50221FE2-3732-40EC-89C5-FD390CBB239C}" dt="2023-04-20T11:09:46.235" v="25" actId="478"/>
+          <ac:spMkLst>
+            <pc:docMk/>
+            <pc:sldMk cId="432629419" sldId="271"/>
+            <ac:spMk id="3" creationId="{AE4ECBC1-7577-530F-9B59-6617182EBD68}"/>
+          </ac:spMkLst>
+        </pc:spChg>
+        <pc:spChg chg="add mod">
+          <ac:chgData name="Andrea Archetti" userId="291975a6-52d4-44d6-83c4-62271c88eb97" providerId="ADAL" clId="{50221FE2-3732-40EC-89C5-FD390CBB239C}" dt="2023-04-20T11:12:08.244" v="71" actId="313"/>
+          <ac:spMkLst>
+            <pc:docMk/>
+            <pc:sldMk cId="432629419" sldId="271"/>
+            <ac:spMk id="6" creationId="{DC198D39-8347-73ED-E942-EA2B126FF033}"/>
+          </ac:spMkLst>
+        </pc:spChg>
+        <pc:picChg chg="add mod">
+          <ac:chgData name="Andrea Archetti" userId="291975a6-52d4-44d6-83c4-62271c88eb97" providerId="ADAL" clId="{50221FE2-3732-40EC-89C5-FD390CBB239C}" dt="2023-04-20T11:09:48.200" v="26" actId="1076"/>
+          <ac:picMkLst>
+            <pc:docMk/>
+            <pc:sldMk cId="432629419" sldId="271"/>
+            <ac:picMk id="5" creationId="{B2C45C3D-3F3C-F685-F5F0-0AB487D75514}"/>
+          </ac:picMkLst>
+        </pc:picChg>
+        <pc:picChg chg="add mod">
+          <ac:chgData name="Andrea Archetti" userId="291975a6-52d4-44d6-83c4-62271c88eb97" providerId="ADAL" clId="{50221FE2-3732-40EC-89C5-FD390CBB239C}" dt="2023-04-20T11:11:56.605" v="70" actId="1076"/>
+          <ac:picMkLst>
+            <pc:docMk/>
+            <pc:sldMk cId="432629419" sldId="271"/>
+            <ac:picMk id="8" creationId="{EFFCD025-88B2-1D3A-AEBA-F5D23D9E3EEA}"/>
+          </ac:picMkLst>
+        </pc:picChg>
+      </pc:sldChg>
+      <pc:sldChg chg="new del">
+        <pc:chgData name="Andrea Archetti" userId="291975a6-52d4-44d6-83c4-62271c88eb97" providerId="ADAL" clId="{50221FE2-3732-40EC-89C5-FD390CBB239C}" dt="2023-04-20T11:12:24.064" v="74" actId="47"/>
+        <pc:sldMkLst>
+          <pc:docMk/>
+          <pc:sldMk cId="1461347305" sldId="272"/>
+        </pc:sldMkLst>
+      </pc:sldChg>
+      <pc:sldChg chg="addSp delSp modSp add mod">
+        <pc:chgData name="Andrea Archetti" userId="291975a6-52d4-44d6-83c4-62271c88eb97" providerId="ADAL" clId="{50221FE2-3732-40EC-89C5-FD390CBB239C}" dt="2023-04-20T11:16:43.691" v="92" actId="1076"/>
+        <pc:sldMkLst>
+          <pc:docMk/>
+          <pc:sldMk cId="1397122212" sldId="273"/>
+        </pc:sldMkLst>
+        <pc:picChg chg="add mod">
+          <ac:chgData name="Andrea Archetti" userId="291975a6-52d4-44d6-83c4-62271c88eb97" providerId="ADAL" clId="{50221FE2-3732-40EC-89C5-FD390CBB239C}" dt="2023-04-20T11:16:43.691" v="92" actId="1076"/>
+          <ac:picMkLst>
+            <pc:docMk/>
+            <pc:sldMk cId="1397122212" sldId="273"/>
+            <ac:picMk id="3" creationId="{230CB3CE-3D5E-372D-9353-A87184E053C5}"/>
+          </ac:picMkLst>
+        </pc:picChg>
+        <pc:picChg chg="del">
+          <ac:chgData name="Andrea Archetti" userId="291975a6-52d4-44d6-83c4-62271c88eb97" providerId="ADAL" clId="{50221FE2-3732-40EC-89C5-FD390CBB239C}" dt="2023-04-20T11:13:03.563" v="76" actId="478"/>
+          <ac:picMkLst>
+            <pc:docMk/>
+            <pc:sldMk cId="1397122212" sldId="273"/>
+            <ac:picMk id="5" creationId="{B2C45C3D-3F3C-F685-F5F0-0AB487D75514}"/>
+          </ac:picMkLst>
+        </pc:picChg>
+        <pc:picChg chg="add del mod">
+          <ac:chgData name="Andrea Archetti" userId="291975a6-52d4-44d6-83c4-62271c88eb97" providerId="ADAL" clId="{50221FE2-3732-40EC-89C5-FD390CBB239C}" dt="2023-04-20T11:16:30.682" v="85" actId="478"/>
+          <ac:picMkLst>
+            <pc:docMk/>
+            <pc:sldMk cId="1397122212" sldId="273"/>
+            <ac:picMk id="7" creationId="{402936DE-199C-1C48-CBCB-0A01728759FC}"/>
+          </ac:picMkLst>
+        </pc:picChg>
+        <pc:picChg chg="del">
+          <ac:chgData name="Andrea Archetti" userId="291975a6-52d4-44d6-83c4-62271c88eb97" providerId="ADAL" clId="{50221FE2-3732-40EC-89C5-FD390CBB239C}" dt="2023-04-20T11:13:02.987" v="75" actId="478"/>
+          <ac:picMkLst>
+            <pc:docMk/>
+            <pc:sldMk cId="1397122212" sldId="273"/>
+            <ac:picMk id="8" creationId="{EFFCD025-88B2-1D3A-AEBA-F5D23D9E3EEA}"/>
+          </ac:picMkLst>
+        </pc:picChg>
+        <pc:picChg chg="add mod">
+          <ac:chgData name="Andrea Archetti" userId="291975a6-52d4-44d6-83c4-62271c88eb97" providerId="ADAL" clId="{50221FE2-3732-40EC-89C5-FD390CBB239C}" dt="2023-04-20T11:16:41.921" v="91" actId="1076"/>
+          <ac:picMkLst>
+            <pc:docMk/>
+            <pc:sldMk cId="1397122212" sldId="273"/>
+            <ac:picMk id="10" creationId="{699F9A29-E8EF-C5D1-1AA9-B10F2B653E00}"/>
+          </ac:picMkLst>
+        </pc:picChg>
+      </pc:sldChg>
+      <pc:sldChg chg="addSp delSp modSp add mod">
+        <pc:chgData name="Andrea Archetti" userId="291975a6-52d4-44d6-83c4-62271c88eb97" providerId="ADAL" clId="{50221FE2-3732-40EC-89C5-FD390CBB239C}" dt="2023-04-20T11:18:31.252" v="101" actId="1076"/>
+        <pc:sldMkLst>
+          <pc:docMk/>
+          <pc:sldMk cId="2747501298" sldId="274"/>
+        </pc:sldMkLst>
+        <pc:picChg chg="del">
+          <ac:chgData name="Andrea Archetti" userId="291975a6-52d4-44d6-83c4-62271c88eb97" providerId="ADAL" clId="{50221FE2-3732-40EC-89C5-FD390CBB239C}" dt="2023-04-20T11:18:08.002" v="94" actId="478"/>
+          <ac:picMkLst>
+            <pc:docMk/>
+            <pc:sldMk cId="2747501298" sldId="274"/>
+            <ac:picMk id="3" creationId="{230CB3CE-3D5E-372D-9353-A87184E053C5}"/>
+          </ac:picMkLst>
+        </pc:picChg>
+        <pc:picChg chg="add mod">
+          <ac:chgData name="Andrea Archetti" userId="291975a6-52d4-44d6-83c4-62271c88eb97" providerId="ADAL" clId="{50221FE2-3732-40EC-89C5-FD390CBB239C}" dt="2023-04-20T11:18:19.192" v="99" actId="1076"/>
+          <ac:picMkLst>
+            <pc:docMk/>
+            <pc:sldMk cId="2747501298" sldId="274"/>
+            <ac:picMk id="4" creationId="{A6EA12E7-F58F-2D7D-2937-1B3C62CCDBA8}"/>
+          </ac:picMkLst>
+        </pc:picChg>
+        <pc:picChg chg="add mod">
+          <ac:chgData name="Andrea Archetti" userId="291975a6-52d4-44d6-83c4-62271c88eb97" providerId="ADAL" clId="{50221FE2-3732-40EC-89C5-FD390CBB239C}" dt="2023-04-20T11:18:31.252" v="101" actId="1076"/>
+          <ac:picMkLst>
+            <pc:docMk/>
+            <pc:sldMk cId="2747501298" sldId="274"/>
+            <ac:picMk id="7" creationId="{ED96029E-4047-586E-4DEC-6454F4B246F3}"/>
+          </ac:picMkLst>
+        </pc:picChg>
+        <pc:picChg chg="del">
+          <ac:chgData name="Andrea Archetti" userId="291975a6-52d4-44d6-83c4-62271c88eb97" providerId="ADAL" clId="{50221FE2-3732-40EC-89C5-FD390CBB239C}" dt="2023-04-20T11:18:08.578" v="95" actId="478"/>
+          <ac:picMkLst>
+            <pc:docMk/>
+            <pc:sldMk cId="2747501298" sldId="274"/>
+            <ac:picMk id="10" creationId="{699F9A29-E8EF-C5D1-1AA9-B10F2B653E00}"/>
+          </ac:picMkLst>
+        </pc:picChg>
       </pc:sldChg>
     </pc:docChg>
   </pc:docChgLst>
@@ -13404,10 +13547,26 @@
               <a:buNone/>
             </a:pPr>
             <a:r>
-              <a:rPr lang="en-GB"/>
-              <a:t>Comparison non lin vs lin model</a:t>
+              <a:rPr lang="en-GB" dirty="0"/>
+              <a:t>Comparison non </a:t>
             </a:r>
-            <a:endParaRPr/>
+            <a:r>
+              <a:rPr lang="en-GB" dirty="0" err="1"/>
+              <a:t>lin</a:t>
+            </a:r>
+            <a:r>
+              <a:rPr lang="en-GB" dirty="0"/>
+              <a:t> vs </a:t>
+            </a:r>
+            <a:r>
+              <a:rPr lang="en-GB" dirty="0" err="1"/>
+              <a:t>lin</a:t>
+            </a:r>
+            <a:r>
+              <a:rPr lang="en-GB" dirty="0"/>
+              <a:t> model</a:t>
+            </a:r>
+            <a:endParaRPr dirty="0"/>
           </a:p>
         </p:txBody>
       </p:sp>
@@ -13466,6 +13625,402 @@
         </p:spPr>
       </p:pic>
     </p:spTree>
+  </p:cSld>
+  <p:clrMapOvr>
+    <a:masterClrMapping/>
+  </p:clrMapOvr>
+</p:sld>
+</file>
+
+<file path=ppt/slides/slide14.xml><?xml version="1.0" encoding="utf-8"?>
+<p:sld xmlns:a="http://schemas.openxmlformats.org/drawingml/2006/main" xmlns:r="http://schemas.openxmlformats.org/officeDocument/2006/relationships" xmlns:p="http://schemas.openxmlformats.org/presentationml/2006/main">
+  <p:cSld>
+    <p:spTree>
+      <p:nvGrpSpPr>
+        <p:cNvPr id="1" name=""/>
+        <p:cNvGrpSpPr/>
+        <p:nvPr/>
+      </p:nvGrpSpPr>
+      <p:grpSpPr>
+        <a:xfrm>
+          <a:off x="0" y="0"/>
+          <a:ext cx="0" cy="0"/>
+          <a:chOff x="0" y="0"/>
+          <a:chExt cx="0" cy="0"/>
+        </a:xfrm>
+      </p:grpSpPr>
+      <p:pic>
+        <p:nvPicPr>
+          <p:cNvPr id="5" name="Immagine 4">
+            <a:extLst>
+              <a:ext uri="{FF2B5EF4-FFF2-40B4-BE49-F238E27FC236}">
+                <a16:creationId xmlns:a16="http://schemas.microsoft.com/office/drawing/2014/main" id="{B2C45C3D-3F3C-F685-F5F0-0AB487D75514}"/>
+              </a:ext>
+            </a:extLst>
+          </p:cNvPr>
+          <p:cNvPicPr>
+            <a:picLocks noChangeAspect="1"/>
+          </p:cNvPicPr>
+          <p:nvPr/>
+        </p:nvPicPr>
+        <p:blipFill>
+          <a:blip r:embed="rId2"/>
+          <a:stretch>
+            <a:fillRect/>
+          </a:stretch>
+        </p:blipFill>
+        <p:spPr>
+          <a:xfrm>
+            <a:off x="5270081" y="811283"/>
+            <a:ext cx="5857464" cy="5235433"/>
+          </a:xfrm>
+          <a:prstGeom prst="rect">
+            <a:avLst/>
+          </a:prstGeom>
+        </p:spPr>
+      </p:pic>
+      <p:sp>
+        <p:nvSpPr>
+          <p:cNvPr id="6" name="CasellaDiTesto 5">
+            <a:extLst>
+              <a:ext uri="{FF2B5EF4-FFF2-40B4-BE49-F238E27FC236}">
+                <a16:creationId xmlns:a16="http://schemas.microsoft.com/office/drawing/2014/main" id="{DC198D39-8347-73ED-E942-EA2B126FF033}"/>
+              </a:ext>
+            </a:extLst>
+          </p:cNvPr>
+          <p:cNvSpPr txBox="1"/>
+          <p:nvPr/>
+        </p:nvSpPr>
+        <p:spPr>
+          <a:xfrm>
+            <a:off x="365760" y="811283"/>
+            <a:ext cx="4726745" cy="1446550"/>
+          </a:xfrm>
+          <a:prstGeom prst="rect">
+            <a:avLst/>
+          </a:prstGeom>
+          <a:noFill/>
+        </p:spPr>
+        <p:txBody>
+          <a:bodyPr wrap="square" rtlCol="0">
+            <a:spAutoFit/>
+          </a:bodyPr>
+          <a:lstStyle/>
+          <a:p>
+            <a:r>
+              <a:rPr lang="it-IT" sz="4400" dirty="0">
+                <a:solidFill>
+                  <a:schemeClr val="dk1"/>
+                </a:solidFill>
+                <a:latin typeface="Calibri"/>
+                <a:cs typeface="Calibri"/>
+                <a:sym typeface="Calibri"/>
+              </a:rPr>
+              <a:t>Frequency Base Control of the Base</a:t>
+            </a:r>
+          </a:p>
+        </p:txBody>
+      </p:sp>
+      <p:pic>
+        <p:nvPicPr>
+          <p:cNvPr id="8" name="Immagine 7">
+            <a:extLst>
+              <a:ext uri="{FF2B5EF4-FFF2-40B4-BE49-F238E27FC236}">
+                <a16:creationId xmlns:a16="http://schemas.microsoft.com/office/drawing/2014/main" id="{EFFCD025-88B2-1D3A-AEBA-F5D23D9E3EEA}"/>
+              </a:ext>
+            </a:extLst>
+          </p:cNvPr>
+          <p:cNvPicPr>
+            <a:picLocks noChangeAspect="1"/>
+          </p:cNvPicPr>
+          <p:nvPr/>
+        </p:nvPicPr>
+        <p:blipFill>
+          <a:blip r:embed="rId3"/>
+          <a:stretch>
+            <a:fillRect/>
+          </a:stretch>
+        </p:blipFill>
+        <p:spPr>
+          <a:xfrm>
+            <a:off x="1064455" y="2257833"/>
+            <a:ext cx="2499014" cy="3641141"/>
+          </a:xfrm>
+          <a:prstGeom prst="rect">
+            <a:avLst/>
+          </a:prstGeom>
+        </p:spPr>
+      </p:pic>
+    </p:spTree>
+    <p:extLst>
+      <p:ext uri="{BB962C8B-B14F-4D97-AF65-F5344CB8AC3E}">
+        <p14:creationId xmlns:p14="http://schemas.microsoft.com/office/powerpoint/2010/main" val="432629419"/>
+      </p:ext>
+    </p:extLst>
+  </p:cSld>
+  <p:clrMapOvr>
+    <a:masterClrMapping/>
+  </p:clrMapOvr>
+</p:sld>
+</file>
+
+<file path=ppt/slides/slide15.xml><?xml version="1.0" encoding="utf-8"?>
+<p:sld xmlns:a="http://schemas.openxmlformats.org/drawingml/2006/main" xmlns:r="http://schemas.openxmlformats.org/officeDocument/2006/relationships" xmlns:p="http://schemas.openxmlformats.org/presentationml/2006/main">
+  <p:cSld>
+    <p:spTree>
+      <p:nvGrpSpPr>
+        <p:cNvPr id="1" name=""/>
+        <p:cNvGrpSpPr/>
+        <p:nvPr/>
+      </p:nvGrpSpPr>
+      <p:grpSpPr>
+        <a:xfrm>
+          <a:off x="0" y="0"/>
+          <a:ext cx="0" cy="0"/>
+          <a:chOff x="0" y="0"/>
+          <a:chExt cx="0" cy="0"/>
+        </a:xfrm>
+      </p:grpSpPr>
+      <p:sp>
+        <p:nvSpPr>
+          <p:cNvPr id="6" name="CasellaDiTesto 5">
+            <a:extLst>
+              <a:ext uri="{FF2B5EF4-FFF2-40B4-BE49-F238E27FC236}">
+                <a16:creationId xmlns:a16="http://schemas.microsoft.com/office/drawing/2014/main" id="{DC198D39-8347-73ED-E942-EA2B126FF033}"/>
+              </a:ext>
+            </a:extLst>
+          </p:cNvPr>
+          <p:cNvSpPr txBox="1"/>
+          <p:nvPr/>
+        </p:nvSpPr>
+        <p:spPr>
+          <a:xfrm>
+            <a:off x="365760" y="811283"/>
+            <a:ext cx="4726745" cy="1446550"/>
+          </a:xfrm>
+          <a:prstGeom prst="rect">
+            <a:avLst/>
+          </a:prstGeom>
+          <a:noFill/>
+        </p:spPr>
+        <p:txBody>
+          <a:bodyPr wrap="square" rtlCol="0">
+            <a:spAutoFit/>
+          </a:bodyPr>
+          <a:lstStyle/>
+          <a:p>
+            <a:r>
+              <a:rPr lang="it-IT" sz="4400" dirty="0">
+                <a:solidFill>
+                  <a:schemeClr val="dk1"/>
+                </a:solidFill>
+                <a:latin typeface="Calibri"/>
+                <a:cs typeface="Calibri"/>
+                <a:sym typeface="Calibri"/>
+              </a:rPr>
+              <a:t>Frequency Base Control of the Base</a:t>
+            </a:r>
+          </a:p>
+        </p:txBody>
+      </p:sp>
+      <p:pic>
+        <p:nvPicPr>
+          <p:cNvPr id="3" name="Immagine 2">
+            <a:extLst>
+              <a:ext uri="{FF2B5EF4-FFF2-40B4-BE49-F238E27FC236}">
+                <a16:creationId xmlns:a16="http://schemas.microsoft.com/office/drawing/2014/main" id="{230CB3CE-3D5E-372D-9353-A87184E053C5}"/>
+              </a:ext>
+            </a:extLst>
+          </p:cNvPr>
+          <p:cNvPicPr>
+            <a:picLocks noChangeAspect="1"/>
+          </p:cNvPicPr>
+          <p:nvPr/>
+        </p:nvPicPr>
+        <p:blipFill>
+          <a:blip r:embed="rId2"/>
+          <a:stretch>
+            <a:fillRect/>
+          </a:stretch>
+        </p:blipFill>
+        <p:spPr>
+          <a:xfrm>
+            <a:off x="365760" y="4600168"/>
+            <a:ext cx="9580098" cy="1681794"/>
+          </a:xfrm>
+          <a:prstGeom prst="rect">
+            <a:avLst/>
+          </a:prstGeom>
+        </p:spPr>
+      </p:pic>
+      <p:pic>
+        <p:nvPicPr>
+          <p:cNvPr id="10" name="Immagine 9">
+            <a:extLst>
+              <a:ext uri="{FF2B5EF4-FFF2-40B4-BE49-F238E27FC236}">
+                <a16:creationId xmlns:a16="http://schemas.microsoft.com/office/drawing/2014/main" id="{699F9A29-E8EF-C5D1-1AA9-B10F2B653E00}"/>
+              </a:ext>
+            </a:extLst>
+          </p:cNvPr>
+          <p:cNvPicPr>
+            <a:picLocks noChangeAspect="1"/>
+          </p:cNvPicPr>
+          <p:nvPr/>
+        </p:nvPicPr>
+        <p:blipFill>
+          <a:blip r:embed="rId3"/>
+          <a:stretch>
+            <a:fillRect/>
+          </a:stretch>
+        </p:blipFill>
+        <p:spPr>
+          <a:xfrm>
+            <a:off x="5685692" y="465451"/>
+            <a:ext cx="6140548" cy="3899472"/>
+          </a:xfrm>
+          <a:prstGeom prst="rect">
+            <a:avLst/>
+          </a:prstGeom>
+        </p:spPr>
+      </p:pic>
+    </p:spTree>
+    <p:extLst>
+      <p:ext uri="{BB962C8B-B14F-4D97-AF65-F5344CB8AC3E}">
+        <p14:creationId xmlns:p14="http://schemas.microsoft.com/office/powerpoint/2010/main" val="1397122212"/>
+      </p:ext>
+    </p:extLst>
+  </p:cSld>
+  <p:clrMapOvr>
+    <a:masterClrMapping/>
+  </p:clrMapOvr>
+</p:sld>
+</file>
+
+<file path=ppt/slides/slide16.xml><?xml version="1.0" encoding="utf-8"?>
+<p:sld xmlns:a="http://schemas.openxmlformats.org/drawingml/2006/main" xmlns:r="http://schemas.openxmlformats.org/officeDocument/2006/relationships" xmlns:p="http://schemas.openxmlformats.org/presentationml/2006/main">
+  <p:cSld>
+    <p:spTree>
+      <p:nvGrpSpPr>
+        <p:cNvPr id="1" name=""/>
+        <p:cNvGrpSpPr/>
+        <p:nvPr/>
+      </p:nvGrpSpPr>
+      <p:grpSpPr>
+        <a:xfrm>
+          <a:off x="0" y="0"/>
+          <a:ext cx="0" cy="0"/>
+          <a:chOff x="0" y="0"/>
+          <a:chExt cx="0" cy="0"/>
+        </a:xfrm>
+      </p:grpSpPr>
+      <p:sp>
+        <p:nvSpPr>
+          <p:cNvPr id="6" name="CasellaDiTesto 5">
+            <a:extLst>
+              <a:ext uri="{FF2B5EF4-FFF2-40B4-BE49-F238E27FC236}">
+                <a16:creationId xmlns:a16="http://schemas.microsoft.com/office/drawing/2014/main" id="{DC198D39-8347-73ED-E942-EA2B126FF033}"/>
+              </a:ext>
+            </a:extLst>
+          </p:cNvPr>
+          <p:cNvSpPr txBox="1"/>
+          <p:nvPr/>
+        </p:nvSpPr>
+        <p:spPr>
+          <a:xfrm>
+            <a:off x="365760" y="811283"/>
+            <a:ext cx="4726745" cy="1446550"/>
+          </a:xfrm>
+          <a:prstGeom prst="rect">
+            <a:avLst/>
+          </a:prstGeom>
+          <a:noFill/>
+        </p:spPr>
+        <p:txBody>
+          <a:bodyPr wrap="square" rtlCol="0">
+            <a:spAutoFit/>
+          </a:bodyPr>
+          <a:lstStyle/>
+          <a:p>
+            <a:r>
+              <a:rPr lang="it-IT" sz="4400" dirty="0">
+                <a:solidFill>
+                  <a:schemeClr val="dk1"/>
+                </a:solidFill>
+                <a:latin typeface="Calibri"/>
+                <a:cs typeface="Calibri"/>
+                <a:sym typeface="Calibri"/>
+              </a:rPr>
+              <a:t>Frequency Base Control of the Base</a:t>
+            </a:r>
+          </a:p>
+        </p:txBody>
+      </p:sp>
+      <p:pic>
+        <p:nvPicPr>
+          <p:cNvPr id="4" name="Immagine 3">
+            <a:extLst>
+              <a:ext uri="{FF2B5EF4-FFF2-40B4-BE49-F238E27FC236}">
+                <a16:creationId xmlns:a16="http://schemas.microsoft.com/office/drawing/2014/main" id="{A6EA12E7-F58F-2D7D-2937-1B3C62CCDBA8}"/>
+              </a:ext>
+            </a:extLst>
+          </p:cNvPr>
+          <p:cNvPicPr>
+            <a:picLocks noChangeAspect="1"/>
+          </p:cNvPicPr>
+          <p:nvPr/>
+        </p:nvPicPr>
+        <p:blipFill>
+          <a:blip r:embed="rId2"/>
+          <a:stretch>
+            <a:fillRect/>
+          </a:stretch>
+        </p:blipFill>
+        <p:spPr>
+          <a:xfrm>
+            <a:off x="5380733" y="1122111"/>
+            <a:ext cx="3130222" cy="5011922"/>
+          </a:xfrm>
+          <a:prstGeom prst="rect">
+            <a:avLst/>
+          </a:prstGeom>
+        </p:spPr>
+      </p:pic>
+      <p:pic>
+        <p:nvPicPr>
+          <p:cNvPr id="7" name="Immagine 6">
+            <a:extLst>
+              <a:ext uri="{FF2B5EF4-FFF2-40B4-BE49-F238E27FC236}">
+                <a16:creationId xmlns:a16="http://schemas.microsoft.com/office/drawing/2014/main" id="{ED96029E-4047-586E-4DEC-6454F4B246F3}"/>
+              </a:ext>
+            </a:extLst>
+          </p:cNvPr>
+          <p:cNvPicPr>
+            <a:picLocks noChangeAspect="1"/>
+          </p:cNvPicPr>
+          <p:nvPr/>
+        </p:nvPicPr>
+        <p:blipFill>
+          <a:blip r:embed="rId3"/>
+          <a:stretch>
+            <a:fillRect/>
+          </a:stretch>
+        </p:blipFill>
+        <p:spPr>
+          <a:xfrm>
+            <a:off x="8510955" y="1122111"/>
+            <a:ext cx="2076740" cy="3829584"/>
+          </a:xfrm>
+          <a:prstGeom prst="rect">
+            <a:avLst/>
+          </a:prstGeom>
+        </p:spPr>
+      </p:pic>
+    </p:spTree>
+    <p:extLst>
+      <p:ext uri="{BB962C8B-B14F-4D97-AF65-F5344CB8AC3E}">
+        <p14:creationId xmlns:p14="http://schemas.microsoft.com/office/powerpoint/2010/main" val="2747501298"/>
+      </p:ext>
+    </p:extLst>
   </p:cSld>
   <p:clrMapOvr>
     <a:masterClrMapping/>

</xml_diff>